<commit_message>
Add images to the presentation
</commit_message>
<xml_diff>
--- a/Presentation and Documentation/Presentation.pptx
+++ b/Presentation and Documentation/Presentation.pptx
@@ -20,15 +20,15 @@
   <p:notesSz cx="6858000" cy="9144000"/>
   <p:embeddedFontLst>
     <p:embeddedFont>
-      <p:font typeface="Staatliches" panose="020B0604020202020204" charset="0"/>
+      <p:font typeface="Roboto" panose="02000000000000000000" pitchFamily="2" charset="0"/>
       <p:regular r:id="rId10"/>
+      <p:bold r:id="rId11"/>
+      <p:italic r:id="rId12"/>
+      <p:boldItalic r:id="rId13"/>
     </p:embeddedFont>
     <p:embeddedFont>
-      <p:font typeface="Roboto" panose="020B0604020202020204" charset="0"/>
-      <p:regular r:id="rId11"/>
-      <p:bold r:id="rId12"/>
-      <p:italic r:id="rId13"/>
-      <p:boldItalic r:id="rId14"/>
+      <p:font typeface="Staatliches" panose="020B0604020202020204" charset="0"/>
+      <p:regular r:id="rId14"/>
     </p:embeddedFont>
   </p:embeddedFontLst>
   <p:defaultTextStyle>
@@ -10891,150 +10891,6 @@
       </p:sp>
       <p:sp>
         <p:nvSpPr>
-          <p:cNvPr id="528" name="Google Shape;528;p48"/>
-          <p:cNvSpPr/>
-          <p:nvPr/>
-        </p:nvSpPr>
-        <p:spPr>
-          <a:xfrm>
-            <a:off x="6612637" y="622329"/>
-            <a:ext cx="733500" cy="733500"/>
-          </a:xfrm>
-          <a:prstGeom prst="ellipse">
-            <a:avLst/>
-          </a:prstGeom>
-          <a:noFill/>
-          <a:ln w="9525" cap="flat" cmpd="sng">
-            <a:solidFill>
-              <a:schemeClr val="lt1"/>
-            </a:solidFill>
-            <a:prstDash val="solid"/>
-            <a:round/>
-            <a:headEnd type="none" w="sm" len="sm"/>
-            <a:tailEnd type="none" w="sm" len="sm"/>
-          </a:ln>
-        </p:spPr>
-        <p:txBody>
-          <a:bodyPr spcFirstLastPara="1" wrap="square" lIns="91425" tIns="91425" rIns="91425" bIns="91425" anchor="ctr" anchorCtr="0">
-            <a:noAutofit/>
-          </a:bodyPr>
-          <a:lstStyle/>
-          <a:p>
-            <a:pPr marL="0" lvl="0" indent="0" algn="l" rtl="0">
-              <a:spcBef>
-                <a:spcPts val="0"/>
-              </a:spcBef>
-              <a:spcAft>
-                <a:spcPts val="0"/>
-              </a:spcAft>
-              <a:buNone/>
-            </a:pPr>
-            <a:endParaRPr/>
-          </a:p>
-        </p:txBody>
-      </p:sp>
-      <p:sp>
-        <p:nvSpPr>
-          <p:cNvPr id="50" name="Google Shape;519;p48">
-            <a:extLst>
-              <a:ext uri="{FF2B5EF4-FFF2-40B4-BE49-F238E27FC236}">
-                <a16:creationId xmlns:a16="http://schemas.microsoft.com/office/drawing/2014/main" id="{0A6BE89D-AF1A-46EC-A815-4B68368A5E6B}"/>
-              </a:ext>
-            </a:extLst>
-          </p:cNvPr>
-          <p:cNvSpPr/>
-          <p:nvPr/>
-        </p:nvSpPr>
-        <p:spPr>
-          <a:xfrm>
-            <a:off x="4221410" y="3005903"/>
-            <a:ext cx="810070" cy="693259"/>
-          </a:xfrm>
-          <a:prstGeom prst="ellipse">
-            <a:avLst/>
-          </a:prstGeom>
-          <a:noFill/>
-          <a:ln w="9525" cap="flat" cmpd="sng">
-            <a:solidFill>
-              <a:schemeClr val="lt1"/>
-            </a:solidFill>
-            <a:prstDash val="solid"/>
-            <a:round/>
-            <a:headEnd type="none" w="sm" len="sm"/>
-            <a:tailEnd type="none" w="sm" len="sm"/>
-          </a:ln>
-        </p:spPr>
-        <p:txBody>
-          <a:bodyPr spcFirstLastPara="1" wrap="square" lIns="91425" tIns="91425" rIns="91425" bIns="91425" anchor="ctr" anchorCtr="0">
-            <a:noAutofit/>
-          </a:bodyPr>
-          <a:lstStyle/>
-          <a:p>
-            <a:pPr marL="0" lvl="0" indent="0" algn="l" rtl="0">
-              <a:spcBef>
-                <a:spcPts val="0"/>
-              </a:spcBef>
-              <a:spcAft>
-                <a:spcPts val="0"/>
-              </a:spcAft>
-              <a:buNone/>
-            </a:pPr>
-            <a:endParaRPr/>
-          </a:p>
-        </p:txBody>
-      </p:sp>
-      <p:sp>
-        <p:nvSpPr>
-          <p:cNvPr id="51" name="Google Shape;519;p48">
-            <a:extLst>
-              <a:ext uri="{FF2B5EF4-FFF2-40B4-BE49-F238E27FC236}">
-                <a16:creationId xmlns:a16="http://schemas.microsoft.com/office/drawing/2014/main" id="{5F7A7DDF-1729-4058-94ED-A95335246CFA}"/>
-              </a:ext>
-            </a:extLst>
-          </p:cNvPr>
-          <p:cNvSpPr/>
-          <p:nvPr/>
-        </p:nvSpPr>
-        <p:spPr>
-          <a:xfrm>
-            <a:off x="6536067" y="3005903"/>
-            <a:ext cx="810070" cy="693259"/>
-          </a:xfrm>
-          <a:prstGeom prst="ellipse">
-            <a:avLst/>
-          </a:prstGeom>
-          <a:noFill/>
-          <a:ln w="9525" cap="flat" cmpd="sng">
-            <a:solidFill>
-              <a:schemeClr val="lt1"/>
-            </a:solidFill>
-            <a:prstDash val="solid"/>
-            <a:round/>
-            <a:headEnd type="none" w="sm" len="sm"/>
-            <a:tailEnd type="none" w="sm" len="sm"/>
-          </a:ln>
-        </p:spPr>
-        <p:txBody>
-          <a:bodyPr spcFirstLastPara="1" wrap="square" lIns="91425" tIns="91425" rIns="91425" bIns="91425" anchor="ctr" anchorCtr="0">
-            <a:noAutofit/>
-          </a:bodyPr>
-          <a:lstStyle/>
-          <a:p>
-            <a:pPr marL="0" lvl="0" indent="0" algn="l" rtl="0">
-              <a:spcBef>
-                <a:spcPts val="0"/>
-              </a:spcBef>
-              <a:spcAft>
-                <a:spcPts val="0"/>
-              </a:spcAft>
-              <a:buNone/>
-            </a:pPr>
-            <a:endParaRPr dirty="0"/>
-          </a:p>
-        </p:txBody>
-      </p:sp>
-      <p:sp>
-        <p:nvSpPr>
           <p:cNvPr id="54" name="TextBox 53">
             <a:extLst>
               <a:ext uri="{FF2B5EF4-FFF2-40B4-BE49-F238E27FC236}">
@@ -11259,11 +11115,152 @@
         <p:spPr>
           <a:xfrm>
             <a:off x="1399734" y="2487293"/>
-            <a:ext cx="1744332" cy="1744332"/>
+            <a:ext cx="1777172" cy="1744332"/>
           </a:xfrm>
           <a:prstGeom prst="rect">
             <a:avLst/>
           </a:prstGeom>
+        </p:spPr>
+      </p:pic>
+      <p:pic>
+        <p:nvPicPr>
+          <p:cNvPr id="1028" name="Picture 4" descr="Няма налично описание.">
+            <a:extLst>
+              <a:ext uri="{FF2B5EF4-FFF2-40B4-BE49-F238E27FC236}">
+                <a16:creationId xmlns:a16="http://schemas.microsoft.com/office/drawing/2014/main" id="{B4182B2E-021A-43DF-833F-1E220905D1EA}"/>
+              </a:ext>
+            </a:extLst>
+          </p:cNvPr>
+          <p:cNvPicPr>
+            <a:picLocks noChangeAspect="1" noChangeArrowheads="1"/>
+          </p:cNvPicPr>
+          <p:nvPr/>
+        </p:nvPicPr>
+        <p:blipFill>
+          <a:blip r:embed="rId6">
+            <a:extLst>
+              <a:ext uri="{28A0092B-C50C-407E-A947-70E740481C1C}">
+                <a14:useLocalDpi xmlns:a14="http://schemas.microsoft.com/office/drawing/2010/main" val="0"/>
+              </a:ext>
+            </a:extLst>
+          </a:blip>
+          <a:srcRect/>
+          <a:stretch>
+            <a:fillRect/>
+          </a:stretch>
+        </p:blipFill>
+        <p:spPr bwMode="auto">
+          <a:xfrm>
+            <a:off x="3696732" y="2482841"/>
+            <a:ext cx="1777173" cy="1744332"/>
+          </a:xfrm>
+          <a:prstGeom prst="rect">
+            <a:avLst/>
+          </a:prstGeom>
+          <a:noFill/>
+          <a:extLst>
+            <a:ext uri="{909E8E84-426E-40DD-AFC4-6F175D3DCCD1}">
+              <a14:hiddenFill xmlns:a14="http://schemas.microsoft.com/office/drawing/2010/main">
+                <a:solidFill>
+                  <a:srgbClr val="FFFFFF"/>
+                </a:solidFill>
+              </a14:hiddenFill>
+            </a:ext>
+          </a:extLst>
+        </p:spPr>
+      </p:pic>
+      <p:pic>
+        <p:nvPicPr>
+          <p:cNvPr id="1030" name="Picture 6" descr="Няма налично описание.">
+            <a:extLst>
+              <a:ext uri="{FF2B5EF4-FFF2-40B4-BE49-F238E27FC236}">
+                <a16:creationId xmlns:a16="http://schemas.microsoft.com/office/drawing/2014/main" id="{B4A18F11-6DD8-48A6-BC1D-F98DF2693477}"/>
+              </a:ext>
+            </a:extLst>
+          </p:cNvPr>
+          <p:cNvPicPr>
+            <a:picLocks noChangeAspect="1" noChangeArrowheads="1"/>
+          </p:cNvPicPr>
+          <p:nvPr/>
+        </p:nvPicPr>
+        <p:blipFill>
+          <a:blip r:embed="rId7">
+            <a:extLst>
+              <a:ext uri="{28A0092B-C50C-407E-A947-70E740481C1C}">
+                <a14:useLocalDpi xmlns:a14="http://schemas.microsoft.com/office/drawing/2010/main" val="0"/>
+              </a:ext>
+            </a:extLst>
+          </a:blip>
+          <a:srcRect/>
+          <a:stretch>
+            <a:fillRect/>
+          </a:stretch>
+        </p:blipFill>
+        <p:spPr bwMode="auto">
+          <a:xfrm>
+            <a:off x="6151572" y="2480366"/>
+            <a:ext cx="1777173" cy="1744332"/>
+          </a:xfrm>
+          <a:prstGeom prst="rect">
+            <a:avLst/>
+          </a:prstGeom>
+          <a:noFill/>
+          <a:extLst>
+            <a:ext uri="{909E8E84-426E-40DD-AFC4-6F175D3DCCD1}">
+              <a14:hiddenFill xmlns:a14="http://schemas.microsoft.com/office/drawing/2010/main">
+                <a:solidFill>
+                  <a:srgbClr val="FFFFFF"/>
+                </a:solidFill>
+              </a14:hiddenFill>
+            </a:ext>
+          </a:extLst>
+        </p:spPr>
+      </p:pic>
+      <p:pic>
+        <p:nvPicPr>
+          <p:cNvPr id="1032" name="Picture 8" descr="Няма налично описание.">
+            <a:extLst>
+              <a:ext uri="{FF2B5EF4-FFF2-40B4-BE49-F238E27FC236}">
+                <a16:creationId xmlns:a16="http://schemas.microsoft.com/office/drawing/2014/main" id="{31A6B839-92BF-444F-BB35-3CBF1B46EB0C}"/>
+              </a:ext>
+            </a:extLst>
+          </p:cNvPr>
+          <p:cNvPicPr>
+            <a:picLocks noChangeAspect="1" noChangeArrowheads="1"/>
+          </p:cNvPicPr>
+          <p:nvPr/>
+        </p:nvPicPr>
+        <p:blipFill>
+          <a:blip r:embed="rId8">
+            <a:extLst>
+              <a:ext uri="{28A0092B-C50C-407E-A947-70E740481C1C}">
+                <a14:useLocalDpi xmlns:a14="http://schemas.microsoft.com/office/drawing/2010/main" val="0"/>
+              </a:ext>
+            </a:extLst>
+          </a:blip>
+          <a:srcRect/>
+          <a:stretch>
+            <a:fillRect/>
+          </a:stretch>
+        </p:blipFill>
+        <p:spPr bwMode="auto">
+          <a:xfrm>
+            <a:off x="6151571" y="315639"/>
+            <a:ext cx="1777173" cy="1742748"/>
+          </a:xfrm>
+          <a:prstGeom prst="rect">
+            <a:avLst/>
+          </a:prstGeom>
+          <a:noFill/>
+          <a:extLst>
+            <a:ext uri="{909E8E84-426E-40DD-AFC4-6F175D3DCCD1}">
+              <a14:hiddenFill xmlns:a14="http://schemas.microsoft.com/office/drawing/2010/main">
+                <a:solidFill>
+                  <a:srgbClr val="FFFFFF"/>
+                </a:solidFill>
+              </a14:hiddenFill>
+            </a:ext>
+          </a:extLst>
         </p:spPr>
       </p:pic>
     </p:spTree>

</xml_diff>